<commit_message>
Second ppt has added in testppt file
</commit_message>
<xml_diff>
--- a/testppt.pptx
+++ b/testppt.pptx
@@ -6,6 +6,7 @@
   </p:sldMasterIdLst>
   <p:sldIdLst>
     <p:sldId id="256" r:id="rId2"/>
+    <p:sldId id="257" r:id="rId3"/>
   </p:sldIdLst>
   <p:sldSz cx="9144000" cy="6858000" type="screen4x3"/>
   <p:notesSz cx="6858000" cy="9144000"/>
@@ -3104,6 +3105,109 @@
             <a:r>
               <a:rPr lang="en-US" smtClean="0"/>
               <a:t>From registration</a:t>
+            </a:r>
+          </a:p>
+          <a:p>
+            <a:endParaRPr lang="en-US" dirty="0"/>
+          </a:p>
+        </p:txBody>
+      </p:sp>
+    </p:spTree>
+  </p:cSld>
+  <p:clrMapOvr>
+    <a:masterClrMapping/>
+  </p:clrMapOvr>
+</p:sld>
+</file>
+
+<file path=ppt/slides/slide2.xml><?xml version="1.0" encoding="utf-8"?>
+<p:sld xmlns:a="http://schemas.openxmlformats.org/drawingml/2006/main" xmlns:r="http://schemas.openxmlformats.org/officeDocument/2006/relationships" xmlns:p="http://schemas.openxmlformats.org/presentationml/2006/main">
+  <p:cSld>
+    <p:spTree>
+      <p:nvGrpSpPr>
+        <p:cNvPr id="1" name=""/>
+        <p:cNvGrpSpPr/>
+        <p:nvPr/>
+      </p:nvGrpSpPr>
+      <p:grpSpPr>
+        <a:xfrm>
+          <a:off x="0" y="0"/>
+          <a:ext cx="0" cy="0"/>
+          <a:chOff x="0" y="0"/>
+          <a:chExt cx="0" cy="0"/>
+        </a:xfrm>
+      </p:grpSpPr>
+      <p:sp>
+        <p:nvSpPr>
+          <p:cNvPr id="2" name="Title 1"/>
+          <p:cNvSpPr>
+            <a:spLocks noGrp="1"/>
+          </p:cNvSpPr>
+          <p:nvPr>
+            <p:ph type="title"/>
+          </p:nvPr>
+        </p:nvSpPr>
+        <p:spPr/>
+        <p:txBody>
+          <a:bodyPr>
+            <a:normAutofit fontScale="90000"/>
+          </a:bodyPr>
+          <a:lstStyle/>
+          <a:p>
+            <a:r>
+              <a:rPr lang="en-US" dirty="0" smtClean="0"/>
+              <a:t>Create folder and see it in </a:t>
+            </a:r>
+            <a:r>
+              <a:rPr lang="en-US" dirty="0" err="1" smtClean="0"/>
+              <a:t>git</a:t>
+            </a:r>
+            <a:r>
+              <a:rPr lang="en-US" dirty="0" smtClean="0"/>
+              <a:t> window</a:t>
+            </a:r>
+            <a:endParaRPr lang="en-US" dirty="0"/>
+          </a:p>
+        </p:txBody>
+      </p:sp>
+      <p:sp>
+        <p:nvSpPr>
+          <p:cNvPr id="3" name="Content Placeholder 2"/>
+          <p:cNvSpPr>
+            <a:spLocks noGrp="1"/>
+          </p:cNvSpPr>
+          <p:nvPr>
+            <p:ph idx="1"/>
+          </p:nvPr>
+        </p:nvSpPr>
+        <p:spPr/>
+        <p:txBody>
+          <a:bodyPr/>
+          <a:lstStyle/>
+          <a:p>
+            <a:r>
+              <a:rPr lang="en-US" dirty="0" smtClean="0"/>
+              <a:t>We can create any new folder to our any drive and see it on </a:t>
+            </a:r>
+            <a:r>
+              <a:rPr lang="en-US" dirty="0" err="1" smtClean="0"/>
+              <a:t>git</a:t>
+            </a:r>
+            <a:r>
+              <a:rPr lang="en-US" dirty="0" smtClean="0"/>
+              <a:t> command prompt.</a:t>
+            </a:r>
+          </a:p>
+          <a:p>
+            <a:r>
+              <a:rPr lang="en-US" dirty="0" smtClean="0"/>
+              <a:t>As well as add that folder to our repository</a:t>
+            </a:r>
+          </a:p>
+          <a:p>
+            <a:r>
+              <a:rPr lang="en-US" dirty="0" smtClean="0"/>
+              <a:t>Using some commands are as follow</a:t>
             </a:r>
           </a:p>
           <a:p>

</xml_diff>

<commit_message>
Added Git all command1 file at 3rd slide
</commit_message>
<xml_diff>
--- a/testppt.pptx
+++ b/testppt.pptx
@@ -6,7 +6,8 @@
   </p:sldMasterIdLst>
   <p:sldIdLst>
     <p:sldId id="256" r:id="rId2"/>
-    <p:sldId id="257" r:id="rId3"/>
+    <p:sldId id="259" r:id="rId3"/>
+    <p:sldId id="258" r:id="rId4"/>
   </p:sldIdLst>
   <p:sldSz cx="9144000" cy="6858000" type="screen4x3"/>
   <p:notesSz cx="6858000" cy="9144000"/>
@@ -3215,6 +3216,81 @@
           </a:p>
         </p:txBody>
       </p:sp>
+    </p:spTree>
+  </p:cSld>
+  <p:clrMapOvr>
+    <a:masterClrMapping/>
+  </p:clrMapOvr>
+</p:sld>
+</file>
+
+<file path=ppt/slides/slide3.xml><?xml version="1.0" encoding="utf-8"?>
+<p:sld xmlns:a="http://schemas.openxmlformats.org/drawingml/2006/main" xmlns:r="http://schemas.openxmlformats.org/officeDocument/2006/relationships" xmlns:p="http://schemas.openxmlformats.org/presentationml/2006/main">
+  <p:cSld>
+    <p:spTree>
+      <p:nvGrpSpPr>
+        <p:cNvPr id="1" name=""/>
+        <p:cNvGrpSpPr/>
+        <p:nvPr/>
+      </p:nvGrpSpPr>
+      <p:grpSpPr>
+        <a:xfrm>
+          <a:off x="0" y="0"/>
+          <a:ext cx="0" cy="0"/>
+          <a:chOff x="0" y="0"/>
+          <a:chExt cx="0" cy="0"/>
+        </a:xfrm>
+      </p:grpSpPr>
+      <p:sp>
+        <p:nvSpPr>
+          <p:cNvPr id="2" name="Title 1"/>
+          <p:cNvSpPr>
+            <a:spLocks noGrp="1"/>
+          </p:cNvSpPr>
+          <p:nvPr>
+            <p:ph type="title"/>
+          </p:nvPr>
+        </p:nvSpPr>
+        <p:spPr/>
+        <p:txBody>
+          <a:bodyPr/>
+          <a:lstStyle/>
+          <a:p>
+            <a:r>
+              <a:rPr lang="en-US" dirty="0" err="1" smtClean="0"/>
+              <a:t>Git</a:t>
+            </a:r>
+            <a:r>
+              <a:rPr lang="en-US" dirty="0" smtClean="0"/>
+              <a:t> commands1</a:t>
+            </a:r>
+            <a:endParaRPr lang="en-US" dirty="0"/>
+          </a:p>
+        </p:txBody>
+      </p:sp>
+      <p:pic>
+        <p:nvPicPr>
+          <p:cNvPr id="4" name="Content Placeholder 3" descr="Git_allcommands_1.png"/>
+          <p:cNvPicPr>
+            <a:picLocks noGrp="1" noChangeAspect="1"/>
+          </p:cNvPicPr>
+          <p:nvPr>
+            <p:ph idx="1"/>
+          </p:nvPr>
+        </p:nvPicPr>
+        <p:blipFill>
+          <a:blip r:embed="rId2"/>
+          <a:stretch>
+            <a:fillRect/>
+          </a:stretch>
+        </p:blipFill>
+        <p:spPr>
+          <a:xfrm>
+            <a:off x="2133600" y="1600200"/>
+            <a:ext cx="5410200" cy="5049785"/>
+          </a:xfrm>
+        </p:spPr>
+      </p:pic>
     </p:spTree>
   </p:cSld>
   <p:clrMapOvr>

</xml_diff>